<commit_message>
Finalized the SQL Database lab
</commit_message>
<xml_diff>
--- a/Data/Azure SQL Database/Session 1 - Introduction and Slides/Azure SQL Database.pptx
+++ b/Data/Azure SQL Database/Session 1 - Introduction and Slides/Azure SQL Database.pptx
@@ -223,7 +223,7 @@
           <a:p>
             <a:fld id="{49B60EF2-7028-489F-85D8-FE86CD7CF2A0}" type="datetimeFigureOut">
               <a:rPr lang="en-US" smtClean="0"/>
-              <a:t>1/27/2017</a:t>
+              <a:t>2/1/2017</a:t>
             </a:fld>
             <a:endParaRPr lang="en-US"/>
           </a:p>
@@ -2106,7 +2106,7 @@
           <a:p>
             <a:fld id="{0459C166-16D3-4A25-A2F8-C51E0E346B22}" type="datetimeFigureOut">
               <a:rPr lang="en-US" smtClean="0"/>
-              <a:t>1/27/2017</a:t>
+              <a:t>2/1/2017</a:t>
             </a:fld>
             <a:endParaRPr lang="en-US"/>
           </a:p>
@@ -2201,7 +2201,7 @@
           <a:p>
             <a:fld id="{0459C166-16D3-4A25-A2F8-C51E0E346B22}" type="datetimeFigureOut">
               <a:rPr lang="en-US" smtClean="0"/>
-              <a:t>1/27/2017</a:t>
+              <a:t>2/1/2017</a:t>
             </a:fld>
             <a:endParaRPr lang="en-US"/>
           </a:p>
@@ -2476,7 +2476,7 @@
           <a:p>
             <a:fld id="{0459C166-16D3-4A25-A2F8-C51E0E346B22}" type="datetimeFigureOut">
               <a:rPr lang="en-US" smtClean="0"/>
-              <a:t>1/27/2017</a:t>
+              <a:t>2/1/2017</a:t>
             </a:fld>
             <a:endParaRPr lang="en-US"/>
           </a:p>
@@ -2728,7 +2728,7 @@
           <a:p>
             <a:fld id="{0459C166-16D3-4A25-A2F8-C51E0E346B22}" type="datetimeFigureOut">
               <a:rPr lang="en-US" smtClean="0"/>
-              <a:t>1/27/2017</a:t>
+              <a:t>2/1/2017</a:t>
             </a:fld>
             <a:endParaRPr lang="en-US"/>
           </a:p>
@@ -2896,7 +2896,7 @@
           <a:p>
             <a:fld id="{0459C166-16D3-4A25-A2F8-C51E0E346B22}" type="datetimeFigureOut">
               <a:rPr lang="en-US" smtClean="0"/>
-              <a:t>1/27/2017</a:t>
+              <a:t>2/1/2017</a:t>
             </a:fld>
             <a:endParaRPr lang="en-US"/>
           </a:p>
@@ -3074,7 +3074,7 @@
           <a:p>
             <a:fld id="{0459C166-16D3-4A25-A2F8-C51E0E346B22}" type="datetimeFigureOut">
               <a:rPr lang="en-US" smtClean="0"/>
-              <a:t>1/27/2017</a:t>
+              <a:t>2/1/2017</a:t>
             </a:fld>
             <a:endParaRPr lang="en-US"/>
           </a:p>
@@ -4979,7 +4979,7 @@
           <a:p>
             <a:fld id="{0459C166-16D3-4A25-A2F8-C51E0E346B22}" type="datetimeFigureOut">
               <a:rPr lang="en-US" smtClean="0"/>
-              <a:t>1/27/2017</a:t>
+              <a:t>2/1/2017</a:t>
             </a:fld>
             <a:endParaRPr lang="en-US"/>
           </a:p>
@@ -10543,7 +10543,7 @@
             <a:fld id="{0459C166-16D3-4A25-A2F8-C51E0E346B22}" type="datetimeFigureOut">
               <a:rPr lang="en-US" smtClean="0"/>
               <a:pPr/>
-              <a:t>1/27/2017</a:t>
+              <a:t>2/1/2017</a:t>
             </a:fld>
             <a:endParaRPr lang="en-US"/>
           </a:p>
@@ -14464,7 +14464,7 @@
           <a:p>
             <a:fld id="{0459C166-16D3-4A25-A2F8-C51E0E346B22}" type="datetimeFigureOut">
               <a:rPr lang="en-US" smtClean="0"/>
-              <a:t>1/27/2017</a:t>
+              <a:t>2/1/2017</a:t>
             </a:fld>
             <a:endParaRPr lang="en-US"/>
           </a:p>
@@ -14828,7 +14828,7 @@
           <a:p>
             <a:fld id="{0459C166-16D3-4A25-A2F8-C51E0E346B22}" type="datetimeFigureOut">
               <a:rPr lang="en-US" smtClean="0"/>
-              <a:t>1/27/2017</a:t>
+              <a:t>2/1/2017</a:t>
             </a:fld>
             <a:endParaRPr lang="en-US"/>
           </a:p>
@@ -14945,7 +14945,7 @@
           <a:p>
             <a:fld id="{0459C166-16D3-4A25-A2F8-C51E0E346B22}" type="datetimeFigureOut">
               <a:rPr lang="en-US" smtClean="0"/>
-              <a:t>1/27/2017</a:t>
+              <a:t>2/1/2017</a:t>
             </a:fld>
             <a:endParaRPr lang="en-US"/>
           </a:p>
@@ -15156,7 +15156,7 @@
           <a:p>
             <a:fld id="{0459C166-16D3-4A25-A2F8-C51E0E346B22}" type="datetimeFigureOut">
               <a:rPr lang="en-US" smtClean="0"/>
-              <a:t>1/27/2017</a:t>
+              <a:t>2/1/2017</a:t>
             </a:fld>
             <a:endParaRPr lang="en-US"/>
           </a:p>
@@ -18032,7 +18032,15 @@
             </a:r>
             <a:r>
               <a:rPr lang="en-US" dirty="0"/>
-              <a:t>database service, built on the  Microsoft SQL Server engine designed to deliver predictable performance and scalability, with no downtime and near-zero administration.</a:t>
+              <a:t>database service, built on the  Microsoft SQL Server engine designed to deliver predictable performance and scalability, with </a:t>
+            </a:r>
+            <a:r>
+              <a:rPr lang="en-US" dirty="0" smtClean="0"/>
+              <a:t>virtually no </a:t>
+            </a:r>
+            <a:r>
+              <a:rPr lang="en-US" dirty="0"/>
+              <a:t>downtime and near-zero administration.</a:t>
             </a:r>
           </a:p>
         </p:txBody>
@@ -18259,7 +18267,7 @@
         <p:spPr>
           <a:xfrm>
             <a:off x="699932" y="2807021"/>
-            <a:ext cx="5087919" cy="2899255"/>
+            <a:ext cx="5087919" cy="3250121"/>
           </a:xfrm>
           <a:prstGeom prst="rect">
             <a:avLst/>
@@ -18281,7 +18289,19 @@
             </a:pPr>
             <a:r>
               <a:rPr lang="en-US" sz="2400" dirty="0"/>
-              <a:t>You’re building new cloud-based applications to take advantage of the cost savings and performance. optimization that cloud services provide. </a:t>
+              <a:t>You’re building new cloud-based applications to take advantage of </a:t>
+            </a:r>
+            <a:r>
+              <a:rPr lang="en-US" sz="2400" dirty="0" smtClean="0"/>
+              <a:t>cost </a:t>
+            </a:r>
+            <a:r>
+              <a:rPr lang="en-US" sz="2400" dirty="0"/>
+              <a:t>savings and performance</a:t>
+            </a:r>
+            <a:r>
+              <a:rPr lang="en-US" sz="2400" dirty="0" smtClean="0"/>
+              <a:t>.</a:t>
             </a:r>
           </a:p>
           <a:p>
@@ -18294,8 +18314,41 @@
               <a:buChar char="•"/>
             </a:pPr>
             <a:r>
+              <a:rPr lang="en-US" sz="2400" dirty="0" smtClean="0"/>
+              <a:t>You need instant scalability.</a:t>
+            </a:r>
+          </a:p>
+          <a:p>
+            <a:pPr marL="231775" indent="-231775">
+              <a:lnSpc>
+                <a:spcPct val="95000"/>
+              </a:lnSpc>
+              <a:buSzPct val="90000"/>
+              <a:buFont typeface="Arial" panose="020B0604020202020204" pitchFamily="34" charset="0"/>
+              <a:buChar char="•"/>
+            </a:pPr>
+            <a:r>
+              <a:rPr lang="en-US" sz="2400" dirty="0" smtClean="0"/>
+              <a:t>You want databases replicated in different regions of the world for backup.</a:t>
+            </a:r>
+            <a:endParaRPr lang="en-US" sz="2400" dirty="0"/>
+          </a:p>
+          <a:p>
+            <a:pPr marL="231775" indent="-231775">
+              <a:lnSpc>
+                <a:spcPct val="95000"/>
+              </a:lnSpc>
+              <a:buSzPct val="90000"/>
+              <a:buFont typeface="Arial" panose="020B0604020202020204" pitchFamily="34" charset="0"/>
+              <a:buChar char="•"/>
+            </a:pPr>
+            <a:r>
               <a:rPr lang="en-US" sz="2400" dirty="0"/>
-              <a:t>You want Microsoft to handle common management operations on your databases.</a:t>
+              <a:t>You want Microsoft to handle common management </a:t>
+            </a:r>
+            <a:r>
+              <a:rPr lang="en-US" sz="2400" dirty="0" smtClean="0"/>
+              <a:t>operations.</a:t>
             </a:r>
             <a:endParaRPr lang="en-US" sz="2400" spc="-200" dirty="0">
               <a:solidFill>
@@ -18750,7 +18803,15 @@
             </a:r>
             <a:r>
               <a:rPr lang="en-US" dirty="0"/>
-              <a:t>is exactly the same experience as working with SQL Server data.</a:t>
+              <a:t>is exactly the same </a:t>
+            </a:r>
+            <a:r>
+              <a:rPr lang="en-US" dirty="0" smtClean="0"/>
+              <a:t>as </a:t>
+            </a:r>
+            <a:r>
+              <a:rPr lang="en-US" dirty="0"/>
+              <a:t>working with SQL Server data.</a:t>
             </a:r>
           </a:p>
         </p:txBody>

</xml_diff>